<commit_message>
template from frontiers EE
</commit_message>
<xml_diff>
--- a/Figures&Rmd/supp figure 2.pptx
+++ b/Figures&Rmd/supp figure 2.pptx
@@ -5,9 +5,10 @@
     <p:sldMasterId id="2147483648" r:id="rId1"/>
   </p:sldMasterIdLst>
   <p:sldIdLst>
-    <p:sldId id="257" r:id="rId2"/>
-    <p:sldId id="258" r:id="rId3"/>
-    <p:sldId id="259" r:id="rId4"/>
+    <p:sldId id="260" r:id="rId2"/>
+    <p:sldId id="257" r:id="rId3"/>
+    <p:sldId id="258" r:id="rId4"/>
+    <p:sldId id="259" r:id="rId5"/>
   </p:sldIdLst>
   <p:sldSz cx="12192000" cy="6858000"/>
   <p:notesSz cx="6858000" cy="9144000"/>
@@ -261,7 +262,7 @@
           <a:p>
             <a:fld id="{0ADD2CDD-3CA3-4A16-A073-D2D61370AC31}" type="datetimeFigureOut">
               <a:rPr lang="en-US" smtClean="0"/>
-              <a:t>3/14/2019</a:t>
+              <a:t>3/27/2019</a:t>
             </a:fld>
             <a:endParaRPr lang="en-US"/>
           </a:p>
@@ -459,7 +460,7 @@
           <a:p>
             <a:fld id="{0ADD2CDD-3CA3-4A16-A073-D2D61370AC31}" type="datetimeFigureOut">
               <a:rPr lang="en-US" smtClean="0"/>
-              <a:t>3/14/2019</a:t>
+              <a:t>3/27/2019</a:t>
             </a:fld>
             <a:endParaRPr lang="en-US"/>
           </a:p>
@@ -667,7 +668,7 @@
           <a:p>
             <a:fld id="{0ADD2CDD-3CA3-4A16-A073-D2D61370AC31}" type="datetimeFigureOut">
               <a:rPr lang="en-US" smtClean="0"/>
-              <a:t>3/14/2019</a:t>
+              <a:t>3/27/2019</a:t>
             </a:fld>
             <a:endParaRPr lang="en-US"/>
           </a:p>
@@ -865,7 +866,7 @@
           <a:p>
             <a:fld id="{0ADD2CDD-3CA3-4A16-A073-D2D61370AC31}" type="datetimeFigureOut">
               <a:rPr lang="en-US" smtClean="0"/>
-              <a:t>3/14/2019</a:t>
+              <a:t>3/27/2019</a:t>
             </a:fld>
             <a:endParaRPr lang="en-US"/>
           </a:p>
@@ -1140,7 +1141,7 @@
           <a:p>
             <a:fld id="{0ADD2CDD-3CA3-4A16-A073-D2D61370AC31}" type="datetimeFigureOut">
               <a:rPr lang="en-US" smtClean="0"/>
-              <a:t>3/14/2019</a:t>
+              <a:t>3/27/2019</a:t>
             </a:fld>
             <a:endParaRPr lang="en-US"/>
           </a:p>
@@ -1405,7 +1406,7 @@
           <a:p>
             <a:fld id="{0ADD2CDD-3CA3-4A16-A073-D2D61370AC31}" type="datetimeFigureOut">
               <a:rPr lang="en-US" smtClean="0"/>
-              <a:t>3/14/2019</a:t>
+              <a:t>3/27/2019</a:t>
             </a:fld>
             <a:endParaRPr lang="en-US"/>
           </a:p>
@@ -1817,7 +1818,7 @@
           <a:p>
             <a:fld id="{0ADD2CDD-3CA3-4A16-A073-D2D61370AC31}" type="datetimeFigureOut">
               <a:rPr lang="en-US" smtClean="0"/>
-              <a:t>3/14/2019</a:t>
+              <a:t>3/27/2019</a:t>
             </a:fld>
             <a:endParaRPr lang="en-US"/>
           </a:p>
@@ -1958,7 +1959,7 @@
           <a:p>
             <a:fld id="{0ADD2CDD-3CA3-4A16-A073-D2D61370AC31}" type="datetimeFigureOut">
               <a:rPr lang="en-US" smtClean="0"/>
-              <a:t>3/14/2019</a:t>
+              <a:t>3/27/2019</a:t>
             </a:fld>
             <a:endParaRPr lang="en-US"/>
           </a:p>
@@ -2071,7 +2072,7 @@
           <a:p>
             <a:fld id="{0ADD2CDD-3CA3-4A16-A073-D2D61370AC31}" type="datetimeFigureOut">
               <a:rPr lang="en-US" smtClean="0"/>
-              <a:t>3/14/2019</a:t>
+              <a:t>3/27/2019</a:t>
             </a:fld>
             <a:endParaRPr lang="en-US"/>
           </a:p>
@@ -2382,7 +2383,7 @@
           <a:p>
             <a:fld id="{0ADD2CDD-3CA3-4A16-A073-D2D61370AC31}" type="datetimeFigureOut">
               <a:rPr lang="en-US" smtClean="0"/>
-              <a:t>3/14/2019</a:t>
+              <a:t>3/27/2019</a:t>
             </a:fld>
             <a:endParaRPr lang="en-US"/>
           </a:p>
@@ -2670,7 +2671,7 @@
           <a:p>
             <a:fld id="{0ADD2CDD-3CA3-4A16-A073-D2D61370AC31}" type="datetimeFigureOut">
               <a:rPr lang="en-US" smtClean="0"/>
-              <a:t>3/14/2019</a:t>
+              <a:t>3/27/2019</a:t>
             </a:fld>
             <a:endParaRPr lang="en-US"/>
           </a:p>
@@ -2911,7 +2912,7 @@
           <a:p>
             <a:fld id="{0ADD2CDD-3CA3-4A16-A073-D2D61370AC31}" type="datetimeFigureOut">
               <a:rPr lang="en-US" smtClean="0"/>
-              <a:t>3/14/2019</a:t>
+              <a:t>3/27/2019</a:t>
             </a:fld>
             <a:endParaRPr lang="en-US"/>
           </a:p>
@@ -3330,262 +3331,222 @@
       </p:grpSpPr>
       <p:pic>
         <p:nvPicPr>
-          <p:cNvPr id="2" name="Picture 1">
-            <a:extLst>
-              <a:ext uri="{FF2B5EF4-FFF2-40B4-BE49-F238E27FC236}">
-                <a16:creationId xmlns:a16="http://schemas.microsoft.com/office/drawing/2014/main" id="{724F7D6F-7AE9-40B9-9A1D-860DDBAC3EC5}"/>
-              </a:ext>
-            </a:extLst>
-          </p:cNvPr>
-          <p:cNvPicPr>
-            <a:picLocks noChangeAspect="1"/>
-          </p:cNvPicPr>
+          <p:cNvPr id="2" name="Picture 1" descr="C:\Users\Elaine.Scott\Documents\LaTex\____TEST____Frontiers_LaTeX_Templates_V2.5\Frontiers LaTeX (Science, Health and Engineering) V2.5 - with Supplementary material (V1.2)\logo1.jpg">
+            <a:extLst>
+              <a:ext uri="{FF2B5EF4-FFF2-40B4-BE49-F238E27FC236}">
+                <a16:creationId xmlns:a16="http://schemas.microsoft.com/office/drawing/2014/main" id="{5551B57E-6D16-4620-BCF2-B4636258E87E}"/>
+              </a:ext>
+            </a:extLst>
+          </p:cNvPr>
+          <p:cNvPicPr/>
           <p:nvPr/>
         </p:nvPicPr>
         <p:blipFill>
-          <a:blip r:embed="rId2"/>
+          <a:blip r:embed="rId2">
+            <a:extLst>
+              <a:ext uri="{28A0092B-C50C-407E-A947-70E740481C1C}">
+                <a14:useLocalDpi xmlns:a14="http://schemas.microsoft.com/office/drawing/2010/main" val="0"/>
+              </a:ext>
+            </a:extLst>
+          </a:blip>
+          <a:srcRect/>
           <a:stretch>
             <a:fillRect/>
           </a:stretch>
         </p:blipFill>
-        <p:spPr>
-          <a:xfrm>
-            <a:off x="321154" y="1381381"/>
-            <a:ext cx="5342857" cy="4095238"/>
-          </a:xfrm>
-          <a:prstGeom prst="rect">
-            <a:avLst/>
-          </a:prstGeom>
-        </p:spPr>
-      </p:pic>
-      <p:sp>
-        <p:nvSpPr>
-          <p:cNvPr id="4" name="TextBox 3">
-            <a:extLst>
-              <a:ext uri="{FF2B5EF4-FFF2-40B4-BE49-F238E27FC236}">
-                <a16:creationId xmlns:a16="http://schemas.microsoft.com/office/drawing/2014/main" id="{91A224DC-5341-45FF-92AC-85AA8DDC62FF}"/>
-              </a:ext>
-            </a:extLst>
-          </p:cNvPr>
-          <p:cNvSpPr txBox="1"/>
-          <p:nvPr/>
-        </p:nvSpPr>
-        <p:spPr>
-          <a:xfrm>
-            <a:off x="0" y="461818"/>
-            <a:ext cx="12192000" cy="461665"/>
+        <p:spPr bwMode="auto">
+          <a:xfrm>
+            <a:off x="600045" y="520642"/>
+            <a:ext cx="1382395" cy="496570"/>
           </a:xfrm>
           <a:prstGeom prst="rect">
             <a:avLst/>
           </a:prstGeom>
           <a:noFill/>
-        </p:spPr>
-        <p:txBody>
-          <a:bodyPr wrap="square" rtlCol="0">
-            <a:spAutoFit/>
-          </a:bodyPr>
-          <a:lstStyle/>
-          <a:p>
-            <a:pPr algn="ctr"/>
-            <a:r>
-              <a:rPr lang="en-US" sz="2400" b="1" dirty="0"/>
-              <a:t>Poisson process assumption: exponentially distributed intervals </a:t>
-            </a:r>
-          </a:p>
-        </p:txBody>
-      </p:sp>
-      <p:sp>
-        <p:nvSpPr>
-          <p:cNvPr id="6" name="TextBox 5">
-            <a:extLst>
-              <a:ext uri="{FF2B5EF4-FFF2-40B4-BE49-F238E27FC236}">
-                <a16:creationId xmlns:a16="http://schemas.microsoft.com/office/drawing/2014/main" id="{971FEE5E-5475-47ED-8C95-FA6D097A06E3}"/>
-              </a:ext>
-            </a:extLst>
-          </p:cNvPr>
-          <p:cNvSpPr txBox="1"/>
+          <a:ln>
+            <a:noFill/>
+          </a:ln>
+        </p:spPr>
+      </p:pic>
+      <p:sp>
+        <p:nvSpPr>
+          <p:cNvPr id="3" name="Rectangle 2">
+            <a:extLst>
+              <a:ext uri="{FF2B5EF4-FFF2-40B4-BE49-F238E27FC236}">
+                <a16:creationId xmlns:a16="http://schemas.microsoft.com/office/drawing/2014/main" id="{E7360E66-878A-409C-BEF8-9B9111A1D1DE}"/>
+              </a:ext>
+            </a:extLst>
+          </p:cNvPr>
+          <p:cNvSpPr/>
           <p:nvPr/>
         </p:nvSpPr>
         <p:spPr>
           <a:xfrm>
-            <a:off x="461818" y="5611351"/>
-            <a:ext cx="2930048" cy="646331"/>
+            <a:off x="1213657" y="2044006"/>
+            <a:ext cx="9958647" cy="3539430"/>
           </a:xfrm>
           <a:prstGeom prst="rect">
             <a:avLst/>
           </a:prstGeom>
-          <a:noFill/>
-        </p:spPr>
-        <p:txBody>
-          <a:bodyPr wrap="square" rtlCol="0">
+        </p:spPr>
+        <p:txBody>
+          <a:bodyPr wrap="square">
             <a:spAutoFit/>
           </a:bodyPr>
           <a:lstStyle/>
           <a:p>
-            <a:r>
-              <a:rPr lang="en-US" dirty="0"/>
-              <a:t>Shorter intervals are more likely – no refractory period</a:t>
-            </a:r>
-          </a:p>
-        </p:txBody>
-      </p:sp>
-      <p:cxnSp>
-        <p:nvCxnSpPr>
-          <p:cNvPr id="8" name="Straight Arrow Connector 7">
-            <a:extLst>
-              <a:ext uri="{FF2B5EF4-FFF2-40B4-BE49-F238E27FC236}">
-                <a16:creationId xmlns:a16="http://schemas.microsoft.com/office/drawing/2014/main" id="{264F7347-38E4-4793-872B-A14EA92AF632}"/>
-              </a:ext>
-            </a:extLst>
-          </p:cNvPr>
-          <p:cNvCxnSpPr>
-            <a:cxnSpLocks/>
-          </p:cNvCxnSpPr>
-          <p:nvPr/>
-        </p:nvCxnSpPr>
-        <p:spPr>
-          <a:xfrm flipV="1">
-            <a:off x="1283855" y="4682837"/>
-            <a:ext cx="0" cy="928514"/>
-          </a:xfrm>
-          <a:prstGeom prst="straightConnector1">
-            <a:avLst/>
-          </a:prstGeom>
-          <a:ln>
-            <a:solidFill>
-              <a:schemeClr val="tx1"/>
-            </a:solidFill>
-            <a:tailEnd type="triangle"/>
-          </a:ln>
-        </p:spPr>
-        <p:style>
-          <a:lnRef idx="1">
-            <a:schemeClr val="accent1"/>
-          </a:lnRef>
-          <a:fillRef idx="0">
-            <a:schemeClr val="accent1"/>
-          </a:fillRef>
-          <a:effectRef idx="0">
-            <a:schemeClr val="accent1"/>
-          </a:effectRef>
-          <a:fontRef idx="minor">
-            <a:schemeClr val="tx1"/>
-          </a:fontRef>
-        </p:style>
-      </p:cxnSp>
-      <p:pic>
-        <p:nvPicPr>
-          <p:cNvPr id="12" name="Picture 11">
-            <a:extLst>
-              <a:ext uri="{FF2B5EF4-FFF2-40B4-BE49-F238E27FC236}">
-                <a16:creationId xmlns:a16="http://schemas.microsoft.com/office/drawing/2014/main" id="{BCCD38E0-C625-42AF-A8F3-6B822EE76F62}"/>
-              </a:ext>
-            </a:extLst>
-          </p:cNvPr>
-          <p:cNvPicPr>
-            <a:picLocks noChangeAspect="1"/>
-          </p:cNvPicPr>
-          <p:nvPr/>
-        </p:nvPicPr>
-        <p:blipFill>
-          <a:blip r:embed="rId3"/>
-          <a:stretch>
-            <a:fillRect/>
-          </a:stretch>
-        </p:blipFill>
-        <p:spPr>
-          <a:xfrm>
-            <a:off x="6626712" y="1196654"/>
-            <a:ext cx="5342857" cy="4095238"/>
-          </a:xfrm>
-          <a:prstGeom prst="rect">
-            <a:avLst/>
-          </a:prstGeom>
-        </p:spPr>
-      </p:pic>
-      <p:sp>
-        <p:nvSpPr>
-          <p:cNvPr id="14" name="Double Bracket 13">
-            <a:extLst>
-              <a:ext uri="{FF2B5EF4-FFF2-40B4-BE49-F238E27FC236}">
-                <a16:creationId xmlns:a16="http://schemas.microsoft.com/office/drawing/2014/main" id="{3DA279F5-0640-43B1-B715-B1143D0CB96D}"/>
-              </a:ext>
-            </a:extLst>
-          </p:cNvPr>
-          <p:cNvSpPr/>
-          <p:nvPr/>
-        </p:nvSpPr>
-        <p:spPr>
-          <a:xfrm>
-            <a:off x="6096001" y="1302327"/>
-            <a:ext cx="5774846" cy="3989565"/>
-          </a:xfrm>
-          <a:prstGeom prst="bracketPair">
-            <a:avLst/>
-          </a:prstGeom>
-        </p:spPr>
-        <p:style>
-          <a:lnRef idx="1">
-            <a:schemeClr val="dk1"/>
-          </a:lnRef>
-          <a:fillRef idx="0">
-            <a:schemeClr val="dk1"/>
-          </a:fillRef>
-          <a:effectRef idx="0">
-            <a:schemeClr val="dk1"/>
-          </a:effectRef>
-          <a:fontRef idx="minor">
-            <a:schemeClr val="tx1"/>
-          </a:fontRef>
-        </p:style>
-        <p:txBody>
-          <a:bodyPr rtlCol="0" anchor="ctr"/>
-          <a:lstStyle/>
-          <a:p>
-            <a:pPr algn="ctr"/>
-            <a:endParaRPr lang="en-US"/>
-          </a:p>
-        </p:txBody>
-      </p:sp>
-      <p:sp>
-        <p:nvSpPr>
-          <p:cNvPr id="15" name="TextBox 14">
-            <a:extLst>
-              <a:ext uri="{FF2B5EF4-FFF2-40B4-BE49-F238E27FC236}">
-                <a16:creationId xmlns:a16="http://schemas.microsoft.com/office/drawing/2014/main" id="{08394F67-6692-47A2-A009-FE8B603730B8}"/>
-              </a:ext>
-            </a:extLst>
-          </p:cNvPr>
-          <p:cNvSpPr txBox="1"/>
-          <p:nvPr/>
-        </p:nvSpPr>
-        <p:spPr>
-          <a:xfrm>
-            <a:off x="6096000" y="3004721"/>
-            <a:ext cx="166255" cy="584775"/>
-          </a:xfrm>
-          <a:prstGeom prst="rect">
-            <a:avLst/>
-          </a:prstGeom>
-          <a:noFill/>
-        </p:spPr>
-        <p:txBody>
-          <a:bodyPr wrap="square" rtlCol="0">
-            <a:spAutoFit/>
-          </a:bodyPr>
-          <a:lstStyle/>
-          <a:p>
-            <a:r>
-              <a:rPr lang="en-US" sz="3200" dirty="0"/>
-              <a:t>=</a:t>
-            </a:r>
+            <a:pPr algn="ctr">
+              <a:spcBef>
+                <a:spcPts val="1200"/>
+              </a:spcBef>
+              <a:spcAft>
+                <a:spcPts val="600"/>
+              </a:spcAft>
+            </a:pPr>
+            <a:r>
+              <a:rPr lang="en-US" b="1" i="1" dirty="0">
+                <a:latin typeface="Times New Roman" panose="02020603050405020304" pitchFamily="18" charset="0"/>
+                <a:ea typeface="Calibri" panose="020F0502020204030204" pitchFamily="34" charset="0"/>
+              </a:rPr>
+              <a:t>Supplementary Figure 2</a:t>
+            </a:r>
+          </a:p>
+          <a:p>
+            <a:pPr algn="ctr">
+              <a:spcBef>
+                <a:spcPts val="1200"/>
+              </a:spcBef>
+              <a:spcAft>
+                <a:spcPts val="1800"/>
+              </a:spcAft>
+            </a:pPr>
+            <a:r>
+              <a:rPr lang="en-US" b="1" dirty="0">
+                <a:latin typeface="Times New Roman" panose="02020603050405020304" pitchFamily="18" charset="0"/>
+                <a:ea typeface="Calibri" panose="020F0502020204030204" pitchFamily="34" charset="0"/>
+              </a:rPr>
+              <a:t>Measuring up to reality: null models and analysis simulations to study parental coordination over provisioning offspring</a:t>
+            </a:r>
+          </a:p>
+          <a:p>
+            <a:pPr>
+              <a:spcBef>
+                <a:spcPts val="1200"/>
+              </a:spcBef>
+              <a:spcAft>
+                <a:spcPts val="1200"/>
+              </a:spcAft>
+            </a:pPr>
+            <a:r>
+              <a:rPr lang="en-US" sz="1400" b="1" dirty="0">
+                <a:latin typeface="Times New Roman" panose="02020603050405020304" pitchFamily="18" charset="0"/>
+                <a:ea typeface="Calibri" panose="020F0502020204030204" pitchFamily="34" charset="0"/>
+              </a:rPr>
+              <a:t>Malika Ihle*, Joel L Pick, Isabel S Winney, Shinichi Nakagawa &amp; Terence Burke </a:t>
+            </a:r>
+          </a:p>
+          <a:p>
+            <a:pPr marL="285750" indent="-285750">
+              <a:spcBef>
+                <a:spcPts val="1200"/>
+              </a:spcBef>
+              <a:spcAft>
+                <a:spcPts val="1200"/>
+              </a:spcAft>
+              <a:buFont typeface="Arial" panose="020B0604020202020204" pitchFamily="34" charset="0"/>
+              <a:buChar char="•"/>
+            </a:pPr>
+            <a:r>
+              <a:rPr lang="en-US" sz="1400" b="1" dirty="0">
+                <a:latin typeface="Times New Roman" panose="02020603050405020304" pitchFamily="18" charset="0"/>
+                <a:ea typeface="Calibri" panose="020F0502020204030204" pitchFamily="34" charset="0"/>
+              </a:rPr>
+              <a:t>Correspondence: </a:t>
+            </a:r>
+            <a:r>
+              <a:rPr lang="en-US" sz="1400" b="1" u="sng" dirty="0">
+                <a:solidFill>
+                  <a:srgbClr val="0000FF"/>
+                </a:solidFill>
+                <a:latin typeface="Times New Roman" panose="02020603050405020304" pitchFamily="18" charset="0"/>
+                <a:ea typeface="Calibri" panose="020F0502020204030204" pitchFamily="34" charset="0"/>
+                <a:hlinkClick r:id="rId3"/>
+              </a:rPr>
+              <a:t>malika_ihle@hotmail.fr</a:t>
+            </a:r>
+            <a:endParaRPr lang="en-US" sz="1400" b="1" u="sng" dirty="0">
+              <a:solidFill>
+                <a:srgbClr val="0000FF"/>
+              </a:solidFill>
+              <a:latin typeface="Times New Roman" panose="02020603050405020304" pitchFamily="18" charset="0"/>
+              <a:ea typeface="Calibri" panose="020F0502020204030204" pitchFamily="34" charset="0"/>
+            </a:endParaRPr>
+          </a:p>
+          <a:p>
+            <a:pPr marL="285750" indent="-285750">
+              <a:spcBef>
+                <a:spcPts val="1200"/>
+              </a:spcBef>
+              <a:spcAft>
+                <a:spcPts val="1200"/>
+              </a:spcAft>
+              <a:buFont typeface="Arial" panose="020B0604020202020204" pitchFamily="34" charset="0"/>
+              <a:buChar char="•"/>
+            </a:pPr>
+            <a:endParaRPr lang="en-US" sz="1400" b="1" u="sng" dirty="0">
+              <a:solidFill>
+                <a:srgbClr val="0000FF"/>
+              </a:solidFill>
+              <a:effectLst/>
+              <a:latin typeface="Times New Roman" panose="02020603050405020304" pitchFamily="18" charset="0"/>
+              <a:ea typeface="Calibri" panose="020F0502020204030204" pitchFamily="34" charset="0"/>
+            </a:endParaRPr>
+          </a:p>
+          <a:p>
+            <a:pPr>
+              <a:spcBef>
+                <a:spcPts val="1200"/>
+              </a:spcBef>
+              <a:spcAft>
+                <a:spcPts val="1200"/>
+              </a:spcAft>
+            </a:pPr>
+            <a:r>
+              <a:rPr lang="en-US" sz="1400" b="1" u="sng" dirty="0">
+                <a:effectLst/>
+                <a:latin typeface="Times New Roman" panose="02020603050405020304" pitchFamily="18" charset="0"/>
+                <a:ea typeface="Calibri" panose="020F0502020204030204" pitchFamily="34" charset="0"/>
+              </a:rPr>
+              <a:t>Supplementary Figure 2</a:t>
+            </a:r>
+            <a:r>
+              <a:rPr lang="en-US" sz="1400" b="1" dirty="0">
+                <a:effectLst/>
+                <a:latin typeface="Times New Roman" panose="02020603050405020304" pitchFamily="18" charset="0"/>
+                <a:ea typeface="Calibri" panose="020F0502020204030204" pitchFamily="34" charset="0"/>
+              </a:rPr>
+              <a:t>: </a:t>
+            </a:r>
+            <a:r>
+              <a:rPr lang="en-US" sz="1400" dirty="0">
+                <a:effectLst/>
+                <a:latin typeface="Times New Roman" panose="02020603050405020304" pitchFamily="18" charset="0"/>
+                <a:ea typeface="Calibri" panose="020F0502020204030204" pitchFamily="34" charset="0"/>
+              </a:rPr>
+              <a:t>Presentation of the assumptions of a Poisson process which we use to simulate random provisioning patterns. Each simulation steps are graphically represented and/or described.</a:t>
+            </a:r>
+            <a:endParaRPr lang="en-US" sz="1400" b="1" u="sng" dirty="0">
+              <a:effectLst/>
+              <a:latin typeface="Times New Roman" panose="02020603050405020304" pitchFamily="18" charset="0"/>
+              <a:ea typeface="Calibri" panose="020F0502020204030204" pitchFamily="34" charset="0"/>
+            </a:endParaRPr>
           </a:p>
         </p:txBody>
       </p:sp>
     </p:spTree>
     <p:extLst>
       <p:ext uri="{BB962C8B-B14F-4D97-AF65-F5344CB8AC3E}">
-        <p14:creationId xmlns:p14="http://schemas.microsoft.com/office/powerpoint/2010/main" val="4104187989"/>
+        <p14:creationId xmlns:p14="http://schemas.microsoft.com/office/powerpoint/2010/main" val="1927510709"/>
       </p:ext>
     </p:extLst>
   </p:cSld>
@@ -3614,6 +3575,290 @@
       </p:grpSpPr>
       <p:pic>
         <p:nvPicPr>
+          <p:cNvPr id="2" name="Picture 1">
+            <a:extLst>
+              <a:ext uri="{FF2B5EF4-FFF2-40B4-BE49-F238E27FC236}">
+                <a16:creationId xmlns:a16="http://schemas.microsoft.com/office/drawing/2014/main" id="{724F7D6F-7AE9-40B9-9A1D-860DDBAC3EC5}"/>
+              </a:ext>
+            </a:extLst>
+          </p:cNvPr>
+          <p:cNvPicPr>
+            <a:picLocks noChangeAspect="1"/>
+          </p:cNvPicPr>
+          <p:nvPr/>
+        </p:nvPicPr>
+        <p:blipFill>
+          <a:blip r:embed="rId2"/>
+          <a:stretch>
+            <a:fillRect/>
+          </a:stretch>
+        </p:blipFill>
+        <p:spPr>
+          <a:xfrm>
+            <a:off x="321154" y="1381381"/>
+            <a:ext cx="5342857" cy="4095238"/>
+          </a:xfrm>
+          <a:prstGeom prst="rect">
+            <a:avLst/>
+          </a:prstGeom>
+        </p:spPr>
+      </p:pic>
+      <p:sp>
+        <p:nvSpPr>
+          <p:cNvPr id="4" name="TextBox 3">
+            <a:extLst>
+              <a:ext uri="{FF2B5EF4-FFF2-40B4-BE49-F238E27FC236}">
+                <a16:creationId xmlns:a16="http://schemas.microsoft.com/office/drawing/2014/main" id="{91A224DC-5341-45FF-92AC-85AA8DDC62FF}"/>
+              </a:ext>
+            </a:extLst>
+          </p:cNvPr>
+          <p:cNvSpPr txBox="1"/>
+          <p:nvPr/>
+        </p:nvSpPr>
+        <p:spPr>
+          <a:xfrm>
+            <a:off x="0" y="461818"/>
+            <a:ext cx="12192000" cy="461665"/>
+          </a:xfrm>
+          <a:prstGeom prst="rect">
+            <a:avLst/>
+          </a:prstGeom>
+          <a:noFill/>
+        </p:spPr>
+        <p:txBody>
+          <a:bodyPr wrap="square" rtlCol="0">
+            <a:spAutoFit/>
+          </a:bodyPr>
+          <a:lstStyle/>
+          <a:p>
+            <a:pPr algn="ctr"/>
+            <a:r>
+              <a:rPr lang="en-US" sz="2400" b="1" dirty="0"/>
+              <a:t>Poisson process assumption: exponentially distributed intervals </a:t>
+            </a:r>
+          </a:p>
+        </p:txBody>
+      </p:sp>
+      <p:sp>
+        <p:nvSpPr>
+          <p:cNvPr id="6" name="TextBox 5">
+            <a:extLst>
+              <a:ext uri="{FF2B5EF4-FFF2-40B4-BE49-F238E27FC236}">
+                <a16:creationId xmlns:a16="http://schemas.microsoft.com/office/drawing/2014/main" id="{971FEE5E-5475-47ED-8C95-FA6D097A06E3}"/>
+              </a:ext>
+            </a:extLst>
+          </p:cNvPr>
+          <p:cNvSpPr txBox="1"/>
+          <p:nvPr/>
+        </p:nvSpPr>
+        <p:spPr>
+          <a:xfrm>
+            <a:off x="461818" y="5611351"/>
+            <a:ext cx="2930048" cy="646331"/>
+          </a:xfrm>
+          <a:prstGeom prst="rect">
+            <a:avLst/>
+          </a:prstGeom>
+          <a:noFill/>
+        </p:spPr>
+        <p:txBody>
+          <a:bodyPr wrap="square" rtlCol="0">
+            <a:spAutoFit/>
+          </a:bodyPr>
+          <a:lstStyle/>
+          <a:p>
+            <a:r>
+              <a:rPr lang="en-US" dirty="0"/>
+              <a:t>Shorter intervals are more likely – no refractory period</a:t>
+            </a:r>
+          </a:p>
+        </p:txBody>
+      </p:sp>
+      <p:cxnSp>
+        <p:nvCxnSpPr>
+          <p:cNvPr id="8" name="Straight Arrow Connector 7">
+            <a:extLst>
+              <a:ext uri="{FF2B5EF4-FFF2-40B4-BE49-F238E27FC236}">
+                <a16:creationId xmlns:a16="http://schemas.microsoft.com/office/drawing/2014/main" id="{264F7347-38E4-4793-872B-A14EA92AF632}"/>
+              </a:ext>
+            </a:extLst>
+          </p:cNvPr>
+          <p:cNvCxnSpPr>
+            <a:cxnSpLocks/>
+          </p:cNvCxnSpPr>
+          <p:nvPr/>
+        </p:nvCxnSpPr>
+        <p:spPr>
+          <a:xfrm flipV="1">
+            <a:off x="1283855" y="4682837"/>
+            <a:ext cx="0" cy="928514"/>
+          </a:xfrm>
+          <a:prstGeom prst="straightConnector1">
+            <a:avLst/>
+          </a:prstGeom>
+          <a:ln>
+            <a:solidFill>
+              <a:schemeClr val="tx1"/>
+            </a:solidFill>
+            <a:tailEnd type="triangle"/>
+          </a:ln>
+        </p:spPr>
+        <p:style>
+          <a:lnRef idx="1">
+            <a:schemeClr val="accent1"/>
+          </a:lnRef>
+          <a:fillRef idx="0">
+            <a:schemeClr val="accent1"/>
+          </a:fillRef>
+          <a:effectRef idx="0">
+            <a:schemeClr val="accent1"/>
+          </a:effectRef>
+          <a:fontRef idx="minor">
+            <a:schemeClr val="tx1"/>
+          </a:fontRef>
+        </p:style>
+      </p:cxnSp>
+      <p:pic>
+        <p:nvPicPr>
+          <p:cNvPr id="12" name="Picture 11">
+            <a:extLst>
+              <a:ext uri="{FF2B5EF4-FFF2-40B4-BE49-F238E27FC236}">
+                <a16:creationId xmlns:a16="http://schemas.microsoft.com/office/drawing/2014/main" id="{BCCD38E0-C625-42AF-A8F3-6B822EE76F62}"/>
+              </a:ext>
+            </a:extLst>
+          </p:cNvPr>
+          <p:cNvPicPr>
+            <a:picLocks noChangeAspect="1"/>
+          </p:cNvPicPr>
+          <p:nvPr/>
+        </p:nvPicPr>
+        <p:blipFill>
+          <a:blip r:embed="rId3"/>
+          <a:stretch>
+            <a:fillRect/>
+          </a:stretch>
+        </p:blipFill>
+        <p:spPr>
+          <a:xfrm>
+            <a:off x="6626712" y="1196654"/>
+            <a:ext cx="5342857" cy="4095238"/>
+          </a:xfrm>
+          <a:prstGeom prst="rect">
+            <a:avLst/>
+          </a:prstGeom>
+        </p:spPr>
+      </p:pic>
+      <p:sp>
+        <p:nvSpPr>
+          <p:cNvPr id="14" name="Double Bracket 13">
+            <a:extLst>
+              <a:ext uri="{FF2B5EF4-FFF2-40B4-BE49-F238E27FC236}">
+                <a16:creationId xmlns:a16="http://schemas.microsoft.com/office/drawing/2014/main" id="{3DA279F5-0640-43B1-B715-B1143D0CB96D}"/>
+              </a:ext>
+            </a:extLst>
+          </p:cNvPr>
+          <p:cNvSpPr/>
+          <p:nvPr/>
+        </p:nvSpPr>
+        <p:spPr>
+          <a:xfrm>
+            <a:off x="6096001" y="1302327"/>
+            <a:ext cx="5774846" cy="3989565"/>
+          </a:xfrm>
+          <a:prstGeom prst="bracketPair">
+            <a:avLst/>
+          </a:prstGeom>
+        </p:spPr>
+        <p:style>
+          <a:lnRef idx="1">
+            <a:schemeClr val="dk1"/>
+          </a:lnRef>
+          <a:fillRef idx="0">
+            <a:schemeClr val="dk1"/>
+          </a:fillRef>
+          <a:effectRef idx="0">
+            <a:schemeClr val="dk1"/>
+          </a:effectRef>
+          <a:fontRef idx="minor">
+            <a:schemeClr val="tx1"/>
+          </a:fontRef>
+        </p:style>
+        <p:txBody>
+          <a:bodyPr rtlCol="0" anchor="ctr"/>
+          <a:lstStyle/>
+          <a:p>
+            <a:pPr algn="ctr"/>
+            <a:endParaRPr lang="en-US"/>
+          </a:p>
+        </p:txBody>
+      </p:sp>
+      <p:sp>
+        <p:nvSpPr>
+          <p:cNvPr id="15" name="TextBox 14">
+            <a:extLst>
+              <a:ext uri="{FF2B5EF4-FFF2-40B4-BE49-F238E27FC236}">
+                <a16:creationId xmlns:a16="http://schemas.microsoft.com/office/drawing/2014/main" id="{08394F67-6692-47A2-A009-FE8B603730B8}"/>
+              </a:ext>
+            </a:extLst>
+          </p:cNvPr>
+          <p:cNvSpPr txBox="1"/>
+          <p:nvPr/>
+        </p:nvSpPr>
+        <p:spPr>
+          <a:xfrm>
+            <a:off x="6096000" y="3004721"/>
+            <a:ext cx="166255" cy="584775"/>
+          </a:xfrm>
+          <a:prstGeom prst="rect">
+            <a:avLst/>
+          </a:prstGeom>
+          <a:noFill/>
+        </p:spPr>
+        <p:txBody>
+          <a:bodyPr wrap="square" rtlCol="0">
+            <a:spAutoFit/>
+          </a:bodyPr>
+          <a:lstStyle/>
+          <a:p>
+            <a:r>
+              <a:rPr lang="en-US" sz="3200" dirty="0"/>
+              <a:t>=</a:t>
+            </a:r>
+          </a:p>
+        </p:txBody>
+      </p:sp>
+    </p:spTree>
+    <p:extLst>
+      <p:ext uri="{BB962C8B-B14F-4D97-AF65-F5344CB8AC3E}">
+        <p14:creationId xmlns:p14="http://schemas.microsoft.com/office/powerpoint/2010/main" val="4104187989"/>
+      </p:ext>
+    </p:extLst>
+  </p:cSld>
+  <p:clrMapOvr>
+    <a:masterClrMapping/>
+  </p:clrMapOvr>
+</p:sld>
+</file>
+
+<file path=ppt/slides/slide3.xml><?xml version="1.0" encoding="utf-8"?>
+<p:sld xmlns:a="http://schemas.openxmlformats.org/drawingml/2006/main" xmlns:r="http://schemas.openxmlformats.org/officeDocument/2006/relationships" xmlns:p="http://schemas.openxmlformats.org/presentationml/2006/main">
+  <p:cSld>
+    <p:spTree>
+      <p:nvGrpSpPr>
+        <p:cNvPr id="1" name=""/>
+        <p:cNvGrpSpPr/>
+        <p:nvPr/>
+      </p:nvGrpSpPr>
+      <p:grpSpPr>
+        <a:xfrm>
+          <a:off x="0" y="0"/>
+          <a:ext cx="0" cy="0"/>
+          <a:chOff x="0" y="0"/>
+          <a:chExt cx="0" cy="0"/>
+        </a:xfrm>
+      </p:grpSpPr>
+      <p:pic>
+        <p:nvPicPr>
           <p:cNvPr id="3" name="Picture 2">
             <a:extLst>
               <a:ext uri="{FF2B5EF4-FFF2-40B4-BE49-F238E27FC236}">
@@ -3966,7 +4211,7 @@
 </p:sld>
 </file>
 
-<file path=ppt/slides/slide3.xml><?xml version="1.0" encoding="utf-8"?>
+<file path=ppt/slides/slide4.xml><?xml version="1.0" encoding="utf-8"?>
 <p:sld xmlns:a="http://schemas.openxmlformats.org/drawingml/2006/main" xmlns:r="http://schemas.openxmlformats.org/officeDocument/2006/relationships" xmlns:p="http://schemas.openxmlformats.org/presentationml/2006/main">
   <p:cSld>
     <p:spTree>

</xml_diff>